<commit_message>
added ML slide to ppt
</commit_message>
<xml_diff>
--- a/Presentation/Social Media Impact_final_ppt.pptx
+++ b/Presentation/Social Media Impact_final_ppt.pptx
@@ -8386,10 +8386,10 @@
       </p:grpSpPr>
       <p:sp useBgFill="1">
         <p:nvSpPr>
-          <p:cNvPr id="44" name="Rectangle 43">
+          <p:cNvPr id="141" name="Rectangle 124">
             <a:extLst>
               <a:ext uri="{FF2B5EF4-FFF2-40B4-BE49-F238E27FC236}">
-                <a16:creationId xmlns:a16="http://schemas.microsoft.com/office/drawing/2014/main" id="{3193BA5C-B8F3-4972-BA54-014C48FAFA42}"/>
+                <a16:creationId xmlns:a16="http://schemas.microsoft.com/office/drawing/2014/main" id="{AF38CBB2-04B5-4ED2-92CA-ABA779049DEA}"/>
               </a:ext>
               <a:ext uri="{C183D7F6-B498-43B3-948B-1728B52AA6E4}">
                 <adec:decorative xmlns:adec="http://schemas.microsoft.com/office/drawing/2017/decorative" val="1"/>
@@ -8446,10 +8446,10 @@
       </p:sp>
       <p:cxnSp>
         <p:nvCxnSpPr>
-          <p:cNvPr id="46" name="Straight Connector 45">
+          <p:cNvPr id="142" name="Straight Connector 126">
             <a:extLst>
               <a:ext uri="{FF2B5EF4-FFF2-40B4-BE49-F238E27FC236}">
-                <a16:creationId xmlns:a16="http://schemas.microsoft.com/office/drawing/2014/main" id="{D7162BAB-C25E-4CE9-B87C-F118DC7E7C22}"/>
+                <a16:creationId xmlns:a16="http://schemas.microsoft.com/office/drawing/2014/main" id="{99ECE436-E5C5-4600-9DAE-6A66A788E0DF}"/>
               </a:ext>
               <a:ext uri="{C183D7F6-B498-43B3-948B-1728B52AA6E4}">
                 <adec:decorative xmlns:adec="http://schemas.microsoft.com/office/drawing/2017/decorative" val="1"/>
@@ -8469,8 +8469,8 @@
         </p:nvCxnSpPr>
         <p:spPr>
           <a:xfrm>
-            <a:off x="1453896" y="1847088"/>
-            <a:ext cx="3530885" cy="0"/>
+            <a:off x="1453897" y="1847088"/>
+            <a:ext cx="5548039" cy="0"/>
           </a:xfrm>
           <a:prstGeom prst="line">
             <a:avLst/>
@@ -8510,8 +8510,8 @@
         </p:nvSpPr>
         <p:spPr>
           <a:xfrm>
-            <a:off x="1451580" y="804520"/>
-            <a:ext cx="3530157" cy="1049235"/>
+            <a:off x="1451579" y="804519"/>
+            <a:ext cx="5550357" cy="1049235"/>
           </a:xfrm>
         </p:spPr>
         <p:txBody>
@@ -8521,7 +8521,7 @@
           <a:lstStyle/>
           <a:p>
             <a:r>
-              <a:rPr lang="en-US" sz="2200" dirty="0"/>
+              <a:rPr lang="en-US" sz="2700"/>
               <a:t>Machine learning – random forest regressor model</a:t>
             </a:r>
           </a:p>
@@ -8529,10 +8529,10 @@
       </p:sp>
       <p:sp>
         <p:nvSpPr>
-          <p:cNvPr id="48" name="Rectangle 47">
+          <p:cNvPr id="143" name="Rectangle 128">
             <a:extLst>
               <a:ext uri="{FF2B5EF4-FFF2-40B4-BE49-F238E27FC236}">
-                <a16:creationId xmlns:a16="http://schemas.microsoft.com/office/drawing/2014/main" id="{05B93327-222A-4DAC-9163-371BF44CDB0C}"/>
+                <a16:creationId xmlns:a16="http://schemas.microsoft.com/office/drawing/2014/main" id="{A81BF76C-52E4-494B-86F2-4CBAC20E3856}"/>
               </a:ext>
               <a:ext uri="{C183D7F6-B498-43B3-948B-1728B52AA6E4}">
                 <adec:decorative xmlns:adec="http://schemas.microsoft.com/office/drawing/2017/decorative" val="1"/>
@@ -8619,8 +8619,8 @@
         </p:nvSpPr>
         <p:spPr>
           <a:xfrm>
-            <a:off x="1451581" y="2015732"/>
-            <a:ext cx="3526523" cy="3450613"/>
+            <a:off x="1451579" y="2015732"/>
+            <a:ext cx="5550357" cy="3450613"/>
           </a:xfrm>
         </p:spPr>
         <p:txBody>
@@ -8630,18 +8630,28 @@
           <a:lstStyle/>
           <a:p>
             <a:pPr marL="0" indent="0">
+              <a:lnSpc>
+                <a:spcPct val="110000"/>
+              </a:lnSpc>
               <a:buNone/>
             </a:pPr>
+            <a:r>
+              <a:rPr lang="en-US" b="0" i="0" dirty="0">
+                <a:effectLst/>
+                <a:latin typeface="-apple-system"/>
+              </a:rPr>
+              <a:t>The random forest regressor model also showed improvement in the residual plot. A residual plot shows the difference between the true value of y and the predicted values of y, ideally, we want our predictions to be close to zero on the y-axis. We can see in the linear regression residual plot; the difference is between the ranges of negative 15 to 10. In the random forest regressor residual plot, the ranges improve by decreasing to a range of negative 2 to 1.5.</a:t>
+            </a:r>
             <a:endParaRPr lang="en-US" dirty="0"/>
           </a:p>
         </p:txBody>
       </p:sp>
       <p:grpSp>
         <p:nvGrpSpPr>
-          <p:cNvPr id="50" name="Group 49">
+          <p:cNvPr id="144" name="Group 130">
             <a:extLst>
               <a:ext uri="{FF2B5EF4-FFF2-40B4-BE49-F238E27FC236}">
-                <a16:creationId xmlns:a16="http://schemas.microsoft.com/office/drawing/2014/main" id="{14EE34E3-F117-4487-8ACF-33DA65FA11B3}"/>
+                <a16:creationId xmlns:a16="http://schemas.microsoft.com/office/drawing/2014/main" id="{CD0703AE-95DE-4C43-8272-BB33A5AD46D3}"/>
               </a:ext>
               <a:ext uri="{C183D7F6-B498-43B3-948B-1728B52AA6E4}">
                 <adec:decorative xmlns:adec="http://schemas.microsoft.com/office/drawing/2017/decorative" val="1"/>
@@ -8661,18 +8671,18 @@
         </p:nvGrpSpPr>
         <p:grpSpPr>
           <a:xfrm>
-            <a:off x="5460131" y="482171"/>
-            <a:ext cx="6091791" cy="5149101"/>
-            <a:chOff x="5460131" y="482171"/>
-            <a:chExt cx="6091791" cy="5149101"/>
+            <a:off x="7477388" y="482171"/>
+            <a:ext cx="4074533" cy="5149101"/>
+            <a:chOff x="7463259" y="583365"/>
+            <a:chExt cx="4074533" cy="5181928"/>
           </a:xfrm>
         </p:grpSpPr>
         <p:sp>
           <p:nvSpPr>
-            <p:cNvPr id="51" name="Rectangle 50">
+            <p:cNvPr id="145" name="Rectangle 131">
               <a:extLst>
                 <a:ext uri="{FF2B5EF4-FFF2-40B4-BE49-F238E27FC236}">
-                  <a16:creationId xmlns:a16="http://schemas.microsoft.com/office/drawing/2014/main" id="{39ACC02C-6424-4165-93C4-E83C8E81D462}"/>
+                  <a16:creationId xmlns:a16="http://schemas.microsoft.com/office/drawing/2014/main" id="{2FF4B413-F360-4A9A-8F55-79C3961709A4}"/>
                 </a:ext>
                 <a:ext uri="{C183D7F6-B498-43B3-948B-1728B52AA6E4}">
                   <adec:decorative xmlns:adec="http://schemas.microsoft.com/office/drawing/2017/decorative" val="1"/>
@@ -8690,8 +8700,8 @@
           </p:nvSpPr>
           <p:spPr>
             <a:xfrm>
-              <a:off x="5460131" y="482171"/>
-              <a:ext cx="6091791" cy="5149101"/>
+              <a:off x="7463259" y="583365"/>
+              <a:ext cx="4074533" cy="5181928"/>
             </a:xfrm>
             <a:prstGeom prst="rect">
               <a:avLst/>
@@ -8750,10 +8760,10 @@
         </p:sp>
         <p:sp>
           <p:nvSpPr>
-            <p:cNvPr id="52" name="Rectangle 51">
+            <p:cNvPr id="146" name="Rectangle 132">
               <a:extLst>
                 <a:ext uri="{FF2B5EF4-FFF2-40B4-BE49-F238E27FC236}">
-                  <a16:creationId xmlns:a16="http://schemas.microsoft.com/office/drawing/2014/main" id="{C182CB9C-C978-4C9B-9AAD-8B1341897550}"/>
+                  <a16:creationId xmlns:a16="http://schemas.microsoft.com/office/drawing/2014/main" id="{D129C2B7-6BA1-4DC0-8ED1-044AFBE47E4C}"/>
                 </a:ext>
                 <a:ext uri="{C183D7F6-B498-43B3-948B-1728B52AA6E4}">
                   <adec:decorative xmlns:adec="http://schemas.microsoft.com/office/drawing/2017/decorative" val="1"/>
@@ -8771,8 +8781,8 @@
           </p:nvSpPr>
           <p:spPr>
             <a:xfrm>
-              <a:off x="5778956" y="812507"/>
-              <a:ext cx="5461780" cy="4466452"/>
+              <a:off x="7776318" y="915807"/>
+              <a:ext cx="3450289" cy="4494927"/>
             </a:xfrm>
             <a:prstGeom prst="rect">
               <a:avLst/>
@@ -8833,93 +8843,19 @@
           </p:txBody>
         </p:sp>
       </p:grpSp>
-      <p:sp>
-        <p:nvSpPr>
-          <p:cNvPr id="54" name="Rectangle 53">
+      <p:pic>
+        <p:nvPicPr>
+          <p:cNvPr id="16" name="Picture 15" descr="Chart, scatter chart&#10;&#10;Description automatically generated">
             <a:extLst>
               <a:ext uri="{FF2B5EF4-FFF2-40B4-BE49-F238E27FC236}">
-                <a16:creationId xmlns:a16="http://schemas.microsoft.com/office/drawing/2014/main" id="{56388820-A63D-463C-9DBC-060A5ABE33B6}"/>
-              </a:ext>
-              <a:ext uri="{C183D7F6-B498-43B3-948B-1728B52AA6E4}">
-                <adec:decorative xmlns:adec="http://schemas.microsoft.com/office/drawing/2017/decorative" val="1"/>
-              </a:ext>
-            </a:extLst>
-          </p:cNvPr>
-          <p:cNvSpPr>
-            <a:spLocks noGrp="1" noRot="1" noChangeAspect="1" noMove="1" noResize="1" noEditPoints="1" noAdjustHandles="1" noChangeArrowheads="1" noChangeShapeType="1" noTextEdit="1"/>
-          </p:cNvSpPr>
-          <p:nvPr>
-            <p:extLst>
-              <p:ext uri="{386F3935-93C4-4BCD-93E2-E3B085C9AB24}">
-                <p16:designElem xmlns:p16="http://schemas.microsoft.com/office/powerpoint/2015/main" val="1"/>
-              </p:ext>
-            </p:extLst>
-          </p:nvPr>
-        </p:nvSpPr>
-        <p:spPr>
-          <a:xfrm>
-            <a:off x="5942379" y="977965"/>
-            <a:ext cx="5134631" cy="4135339"/>
-          </a:xfrm>
-          <a:prstGeom prst="rect">
-            <a:avLst/>
-          </a:prstGeom>
-          <a:solidFill>
-            <a:schemeClr val="bg1"/>
-          </a:solidFill>
-          <a:ln w="6350">
-            <a:solidFill>
-              <a:schemeClr val="bg2"/>
-            </a:solidFill>
-          </a:ln>
-        </p:spPr>
-        <p:style>
-          <a:lnRef idx="2">
-            <a:schemeClr val="accent1">
-              <a:shade val="50000"/>
-            </a:schemeClr>
-          </a:lnRef>
-          <a:fillRef idx="1">
-            <a:schemeClr val="accent1"/>
-          </a:fillRef>
-          <a:effectRef idx="0">
-            <a:schemeClr val="accent1"/>
-          </a:effectRef>
-          <a:fontRef idx="minor">
-            <a:schemeClr val="lt1"/>
-          </a:fontRef>
-        </p:style>
-        <p:txBody>
-          <a:bodyPr rtlCol="0" anchor="ctr"/>
-          <a:lstStyle/>
-          <a:p>
-            <a:pPr algn="ctr"/>
-            <a:endParaRPr lang="en-US"/>
-          </a:p>
-        </p:txBody>
-      </p:sp>
-      <p:pic>
-        <p:nvPicPr>
-          <p:cNvPr id="56" name="Picture 55">
-            <a:extLst>
-              <a:ext uri="{FF2B5EF4-FFF2-40B4-BE49-F238E27FC236}">
-                <a16:creationId xmlns:a16="http://schemas.microsoft.com/office/drawing/2014/main" id="{C04ED70F-D6FD-4EB1-A171-D30F885FE73E}"/>
-              </a:ext>
-              <a:ext uri="{C183D7F6-B498-43B3-948B-1728B52AA6E4}">
-                <adec:decorative xmlns:adec="http://schemas.microsoft.com/office/drawing/2017/decorative" val="1"/>
+                <a16:creationId xmlns:a16="http://schemas.microsoft.com/office/drawing/2014/main" id="{9FA781DF-9250-46CB-A6DF-A3271E9B751E}"/>
               </a:ext>
             </a:extLst>
           </p:cNvPr>
           <p:cNvPicPr>
-            <a:picLocks noGrp="1" noRot="1" noChangeAspect="1" noMove="1" noResize="1" noEditPoints="1" noAdjustHandles="1" noChangeArrowheads="1" noChangeShapeType="1" noCrop="1"/>
+            <a:picLocks noChangeAspect="1"/>
           </p:cNvPicPr>
-          <p:nvPr>
-            <p:extLst>
-              <p:ext uri="{386F3935-93C4-4BCD-93E2-E3B085C9AB24}">
-                <p16:designElem xmlns:p16="http://schemas.microsoft.com/office/powerpoint/2015/main" val="1"/>
-              </p:ext>
-            </p:extLst>
-          </p:nvPr>
+          <p:nvPr/>
         </p:nvPicPr>
         <p:blipFill rotWithShape="1">
           <a:blip r:embed="rId2">
@@ -8929,6 +8865,85 @@
               </a:ext>
             </a:extLst>
           </a:blip>
+          <a:srcRect l="1713" r="4142" b="2"/>
+          <a:stretch/>
+        </p:blipFill>
+        <p:spPr>
+          <a:xfrm>
+            <a:off x="7828917" y="811445"/>
+            <a:ext cx="3310138" cy="2155688"/>
+          </a:xfrm>
+          <a:prstGeom prst="rect">
+            <a:avLst/>
+          </a:prstGeom>
+        </p:spPr>
+      </p:pic>
+      <p:pic>
+        <p:nvPicPr>
+          <p:cNvPr id="14" name="Picture 13" descr="Chart, scatter chart&#10;&#10;Description automatically generated">
+            <a:extLst>
+              <a:ext uri="{FF2B5EF4-FFF2-40B4-BE49-F238E27FC236}">
+                <a16:creationId xmlns:a16="http://schemas.microsoft.com/office/drawing/2014/main" id="{CE2BF7B1-B89F-4C9E-A69C-7B38A073F9BA}"/>
+              </a:ext>
+            </a:extLst>
+          </p:cNvPr>
+          <p:cNvPicPr>
+            <a:picLocks noChangeAspect="1"/>
+          </p:cNvPicPr>
+          <p:nvPr/>
+        </p:nvPicPr>
+        <p:blipFill rotWithShape="1">
+          <a:blip r:embed="rId3">
+            <a:extLst>
+              <a:ext uri="{28A0092B-C50C-407E-A947-70E740481C1C}">
+                <a14:useLocalDpi xmlns:a14="http://schemas.microsoft.com/office/drawing/2010/main" val="0"/>
+              </a:ext>
+            </a:extLst>
+          </a:blip>
+          <a:srcRect l="561" r="-3" b="-3"/>
+          <a:stretch/>
+        </p:blipFill>
+        <p:spPr>
+          <a:xfrm>
+            <a:off x="7828917" y="3131725"/>
+            <a:ext cx="3310138" cy="2040857"/>
+          </a:xfrm>
+          <a:prstGeom prst="rect">
+            <a:avLst/>
+          </a:prstGeom>
+        </p:spPr>
+      </p:pic>
+      <p:pic>
+        <p:nvPicPr>
+          <p:cNvPr id="147" name="Picture 134">
+            <a:extLst>
+              <a:ext uri="{FF2B5EF4-FFF2-40B4-BE49-F238E27FC236}">
+                <a16:creationId xmlns:a16="http://schemas.microsoft.com/office/drawing/2014/main" id="{0C24E7C2-F39B-4280-9B81-F15BBD93C3A9}"/>
+              </a:ext>
+              <a:ext uri="{C183D7F6-B498-43B3-948B-1728B52AA6E4}">
+                <adec:decorative xmlns:adec="http://schemas.microsoft.com/office/drawing/2017/decorative" val="1"/>
+              </a:ext>
+            </a:extLst>
+          </p:cNvPr>
+          <p:cNvPicPr>
+            <a:picLocks noGrp="1" noRot="1" noChangeAspect="1" noMove="1" noResize="1" noEditPoints="1" noAdjustHandles="1" noChangeArrowheads="1" noChangeShapeType="1" noCrop="1"/>
+          </p:cNvPicPr>
+          <p:nvPr>
+            <p:extLst>
+              <p:ext uri="{386F3935-93C4-4BCD-93E2-E3B085C9AB24}">
+                <p16:designElem xmlns:p16="http://schemas.microsoft.com/office/powerpoint/2015/main" val="1"/>
+              </p:ext>
+            </p:extLst>
+          </p:nvPr>
+        </p:nvPicPr>
+        <p:blipFill rotWithShape="1">
+          <a:blip r:embed="rId4">
+            <a:extLst>
+              <a:ext uri="{28A0092B-C50C-407E-A947-70E740481C1C}">
+                <a14:useLocalDpi xmlns:a14="http://schemas.microsoft.com/office/drawing/2010/main" val="0"/>
+              </a:ext>
+            </a:extLst>
+          </a:blip>
           <a:srcRect t="1538" b="-1538"/>
           <a:stretch/>
         </p:blipFill>
@@ -8944,10 +8959,10 @@
       </p:pic>
       <p:cxnSp>
         <p:nvCxnSpPr>
-          <p:cNvPr id="58" name="Straight Connector 57">
+          <p:cNvPr id="148" name="Straight Connector 136">
             <a:extLst>
               <a:ext uri="{FF2B5EF4-FFF2-40B4-BE49-F238E27FC236}">
-                <a16:creationId xmlns:a16="http://schemas.microsoft.com/office/drawing/2014/main" id="{DA26CAE9-74C4-4EDD-8A80-77F79EAA86F4}"/>
+                <a16:creationId xmlns:a16="http://schemas.microsoft.com/office/drawing/2014/main" id="{F381DAA9-C4BA-4BB3-8F4B-3BC4B43EB336}"/>
               </a:ext>
               <a:ext uri="{C183D7F6-B498-43B3-948B-1728B52AA6E4}">
                 <adec:decorative xmlns:adec="http://schemas.microsoft.com/office/drawing/2017/decorative" val="1"/>
@@ -8999,7 +9014,7 @@
     </p:spTree>
     <p:extLst>
       <p:ext uri="{BB962C8B-B14F-4D97-AF65-F5344CB8AC3E}">
-        <p14:creationId xmlns:p14="http://schemas.microsoft.com/office/powerpoint/2010/main" val="913417766"/>
+        <p14:creationId xmlns:p14="http://schemas.microsoft.com/office/powerpoint/2010/main" val="2724589346"/>
       </p:ext>
     </p:extLst>
   </p:cSld>

</xml_diff>